<commit_message>
added docker-buildx install instruction
</commit_message>
<xml_diff>
--- a/intro-to-docker.pptx
+++ b/intro-to-docker.pptx
@@ -119,6 +119,11 @@
       </a:defRPr>
     </a:lvl9pPr>
   </p:defaultTextStyle>
+  <p:extLst>
+    <p:ext uri="{EFAFB233-063F-42B5-8137-9DF3F51BA10A}">
+      <p15:sldGuideLst xmlns:p15="http://schemas.microsoft.com/office/powerpoint/2012/main"/>
+    </p:ext>
+  </p:extLst>
 </p:presentation>
 </file>
 
@@ -204,7 +209,7 @@
           <a:p>
             <a:fld id="{F90D413C-D376-4B86-A84A-774D924B37A4}" type="datetimeFigureOut">
               <a:rPr lang="en-US" smtClean="0"/>
-              <a:t>11/23/2024</a:t>
+              <a:t>11/24/2024</a:t>
             </a:fld>
             <a:endParaRPr lang="en-US"/>
           </a:p>
@@ -812,7 +817,7 @@
           <a:p>
             <a:fld id="{565851E1-E523-409B-8807-55AAA3447275}" type="datetimeFigureOut">
               <a:rPr lang="en-US" smtClean="0"/>
-              <a:t>11/23/2024</a:t>
+              <a:t>11/24/2024</a:t>
             </a:fld>
             <a:endParaRPr lang="en-US"/>
           </a:p>
@@ -1010,7 +1015,7 @@
           <a:p>
             <a:fld id="{565851E1-E523-409B-8807-55AAA3447275}" type="datetimeFigureOut">
               <a:rPr lang="en-US" smtClean="0"/>
-              <a:t>11/23/2024</a:t>
+              <a:t>11/24/2024</a:t>
             </a:fld>
             <a:endParaRPr lang="en-US"/>
           </a:p>
@@ -1218,7 +1223,7 @@
           <a:p>
             <a:fld id="{565851E1-E523-409B-8807-55AAA3447275}" type="datetimeFigureOut">
               <a:rPr lang="en-US" smtClean="0"/>
-              <a:t>11/23/2024</a:t>
+              <a:t>11/24/2024</a:t>
             </a:fld>
             <a:endParaRPr lang="en-US"/>
           </a:p>
@@ -1416,7 +1421,7 @@
           <a:p>
             <a:fld id="{565851E1-E523-409B-8807-55AAA3447275}" type="datetimeFigureOut">
               <a:rPr lang="en-US" smtClean="0"/>
-              <a:t>11/23/2024</a:t>
+              <a:t>11/24/2024</a:t>
             </a:fld>
             <a:endParaRPr lang="en-US"/>
           </a:p>
@@ -1691,7 +1696,7 @@
           <a:p>
             <a:fld id="{565851E1-E523-409B-8807-55AAA3447275}" type="datetimeFigureOut">
               <a:rPr lang="en-US" smtClean="0"/>
-              <a:t>11/23/2024</a:t>
+              <a:t>11/24/2024</a:t>
             </a:fld>
             <a:endParaRPr lang="en-US"/>
           </a:p>
@@ -1956,7 +1961,7 @@
           <a:p>
             <a:fld id="{565851E1-E523-409B-8807-55AAA3447275}" type="datetimeFigureOut">
               <a:rPr lang="en-US" smtClean="0"/>
-              <a:t>11/23/2024</a:t>
+              <a:t>11/24/2024</a:t>
             </a:fld>
             <a:endParaRPr lang="en-US"/>
           </a:p>
@@ -2368,7 +2373,7 @@
           <a:p>
             <a:fld id="{565851E1-E523-409B-8807-55AAA3447275}" type="datetimeFigureOut">
               <a:rPr lang="en-US" smtClean="0"/>
-              <a:t>11/23/2024</a:t>
+              <a:t>11/24/2024</a:t>
             </a:fld>
             <a:endParaRPr lang="en-US"/>
           </a:p>
@@ -2509,7 +2514,7 @@
           <a:p>
             <a:fld id="{565851E1-E523-409B-8807-55AAA3447275}" type="datetimeFigureOut">
               <a:rPr lang="en-US" smtClean="0"/>
-              <a:t>11/23/2024</a:t>
+              <a:t>11/24/2024</a:t>
             </a:fld>
             <a:endParaRPr lang="en-US"/>
           </a:p>
@@ -2622,7 +2627,7 @@
           <a:p>
             <a:fld id="{565851E1-E523-409B-8807-55AAA3447275}" type="datetimeFigureOut">
               <a:rPr lang="en-US" smtClean="0"/>
-              <a:t>11/23/2024</a:t>
+              <a:t>11/24/2024</a:t>
             </a:fld>
             <a:endParaRPr lang="en-US"/>
           </a:p>
@@ -2933,7 +2938,7 @@
           <a:p>
             <a:fld id="{565851E1-E523-409B-8807-55AAA3447275}" type="datetimeFigureOut">
               <a:rPr lang="en-US" smtClean="0"/>
-              <a:t>11/23/2024</a:t>
+              <a:t>11/24/2024</a:t>
             </a:fld>
             <a:endParaRPr lang="en-US"/>
           </a:p>
@@ -3221,7 +3226,7 @@
           <a:p>
             <a:fld id="{565851E1-E523-409B-8807-55AAA3447275}" type="datetimeFigureOut">
               <a:rPr lang="en-US" smtClean="0"/>
-              <a:t>11/23/2024</a:t>
+              <a:t>11/24/2024</a:t>
             </a:fld>
             <a:endParaRPr lang="en-US"/>
           </a:p>
@@ -3462,7 +3467,7 @@
           <a:p>
             <a:fld id="{565851E1-E523-409B-8807-55AAA3447275}" type="datetimeFigureOut">
               <a:rPr lang="en-US" smtClean="0"/>
-              <a:t>11/23/2024</a:t>
+              <a:t>11/24/2024</a:t>
             </a:fld>
             <a:endParaRPr lang="en-US"/>
           </a:p>
@@ -8098,6 +8103,21 @@
               <a:rPr lang="en-US" sz="4000" dirty="0"/>
               <a:t> apt install docker-compose</a:t>
             </a:r>
+          </a:p>
+          <a:p>
+            <a:r>
+              <a:rPr lang="en-US" sz="4000" dirty="0" err="1"/>
+              <a:t>sudo</a:t>
+            </a:r>
+            <a:r>
+              <a:rPr lang="en-US" sz="4000" dirty="0"/>
+              <a:t> apt install docker-</a:t>
+            </a:r>
+            <a:r>
+              <a:rPr lang="en-US" sz="4000" dirty="0" err="1"/>
+              <a:t>buildx</a:t>
+            </a:r>
+            <a:endParaRPr lang="en-US" sz="4000" dirty="0"/>
           </a:p>
         </p:txBody>
       </p:sp>

</xml_diff>